<commit_message>
embiggened the map; ensmallened the references
</commit_message>
<xml_diff>
--- a/MICS-infographic/MICS-infographic.pptx
+++ b/MICS-infographic/MICS-infographic.pptx
@@ -3473,7 +3473,7 @@
             <a:r>
               <a:rPr lang="en-US" sz="1400" b="1" kern="0" dirty="0">
                 <a:solidFill>
-                  <a:srgbClr val="0070C0"/>
+                  <a:srgbClr val="FF0000"/>
                 </a:solidFill>
                 <a:latin typeface="Arial" panose="020B0604020202020204" pitchFamily="34" charset="0"/>
                 <a:ea typeface="Times New Roman" panose="02020603050405020304" pitchFamily="18" charset="0"/>
@@ -3509,7 +3509,7 @@
             <a:r>
               <a:rPr lang="en-US" sz="1400" b="1" kern="0" dirty="0">
                 <a:solidFill>
-                  <a:srgbClr val="0070C0"/>
+                  <a:srgbClr val="FF0000"/>
                 </a:solidFill>
                 <a:latin typeface="Arial" panose="020B0604020202020204" pitchFamily="34" charset="0"/>
                 <a:ea typeface="Times New Roman" panose="02020603050405020304" pitchFamily="18" charset="0"/>
@@ -3545,7 +3545,7 @@
             <a:r>
               <a:rPr lang="en-US" sz="1400" b="1" kern="0" dirty="0">
                 <a:solidFill>
-                  <a:srgbClr val="0070C0"/>
+                  <a:srgbClr val="FF0000"/>
                 </a:solidFill>
                 <a:latin typeface="Arial" panose="020B0604020202020204" pitchFamily="34" charset="0"/>
                 <a:ea typeface="Times New Roman" panose="02020603050405020304" pitchFamily="18" charset="0"/>
@@ -3625,8 +3625,8 @@
         </p:blipFill>
         <p:spPr bwMode="auto">
           <a:xfrm>
-            <a:off x="4541560" y="3360042"/>
-            <a:ext cx="2053052" cy="1123121"/>
+            <a:off x="3429001" y="3403516"/>
+            <a:ext cx="3165611" cy="1731746"/>
           </a:xfrm>
           <a:prstGeom prst="rect">
             <a:avLst/>
@@ -3647,8 +3647,8 @@
         </p:nvSpPr>
         <p:spPr>
           <a:xfrm>
-            <a:off x="3429001" y="4367575"/>
-            <a:ext cx="3165611" cy="4673074"/>
+            <a:off x="3429001" y="5142828"/>
+            <a:ext cx="3165611" cy="3749744"/>
           </a:xfrm>
           <a:prstGeom prst="rect">
             <a:avLst/>
@@ -3666,7 +3666,7 @@
               </a:spcBef>
             </a:pPr>
             <a:r>
-              <a:rPr lang="en-US" sz="800" b="1" kern="0" dirty="0">
+              <a:rPr lang="en-US" sz="700" b="1" kern="0" dirty="0">
                 <a:latin typeface="Arial" panose="020B0604020202020204" pitchFamily="34" charset="0"/>
                 <a:ea typeface="Times New Roman" panose="02020603050405020304" pitchFamily="18" charset="0"/>
                 <a:cs typeface="Arial" panose="020B0604020202020204" pitchFamily="34" charset="0"/>
@@ -3681,7 +3681,7 @@
               </a:spcAft>
             </a:pPr>
             <a:r>
-              <a:rPr lang="en-US" sz="800" dirty="0">
+              <a:rPr lang="en-US" sz="700" dirty="0">
                 <a:latin typeface="Arial" panose="020B0604020202020204" pitchFamily="34" charset="0"/>
                 <a:ea typeface="Cambria" panose="02040503050406030204" pitchFamily="18" charset="0"/>
                 <a:cs typeface="Arial" panose="020B0604020202020204" pitchFamily="34" charset="0"/>
@@ -3689,7 +3689,7 @@
               <a:t>Grogan-Kaylor, Andrew, Berenice Castillo, Garrett T Pace, Kaitlin P Ward, Julie Ma, Shawna J Lee, and Heather </a:t>
             </a:r>
             <a:r>
-              <a:rPr lang="en-US" sz="800" dirty="0" err="1">
+              <a:rPr lang="en-US" sz="700" dirty="0" err="1">
                 <a:latin typeface="Arial" panose="020B0604020202020204" pitchFamily="34" charset="0"/>
                 <a:ea typeface="Cambria" panose="02040503050406030204" pitchFamily="18" charset="0"/>
                 <a:cs typeface="Arial" panose="020B0604020202020204" pitchFamily="34" charset="0"/>
@@ -3697,7 +3697,7 @@
               <a:t>Knauer</a:t>
             </a:r>
             <a:r>
-              <a:rPr lang="en-US" sz="800" dirty="0">
+              <a:rPr lang="en-US" sz="700" dirty="0">
                 <a:latin typeface="Arial" panose="020B0604020202020204" pitchFamily="34" charset="0"/>
                 <a:ea typeface="Cambria" panose="02040503050406030204" pitchFamily="18" charset="0"/>
                 <a:cs typeface="Arial" panose="020B0604020202020204" pitchFamily="34" charset="0"/>
@@ -3705,7 +3705,7 @@
               <a:t>. 2021. “Global perspectives on physical and nonphysical discipline: A Bayesian multilevel analysis.” </a:t>
             </a:r>
             <a:r>
-              <a:rPr lang="en-US" sz="800" i="1" dirty="0">
+              <a:rPr lang="en-US" sz="700" i="1" dirty="0">
                 <a:latin typeface="Arial" panose="020B0604020202020204" pitchFamily="34" charset="0"/>
                 <a:ea typeface="Cambria" panose="02040503050406030204" pitchFamily="18" charset="0"/>
                 <a:cs typeface="Arial" panose="020B0604020202020204" pitchFamily="34" charset="0"/>
@@ -3713,7 +3713,7 @@
               <a:t>International Journal of Behavioral Development</a:t>
             </a:r>
             <a:r>
-              <a:rPr lang="en-US" sz="800" dirty="0">
+              <a:rPr lang="en-US" sz="700" dirty="0">
                 <a:latin typeface="Arial" panose="020B0604020202020204" pitchFamily="34" charset="0"/>
                 <a:ea typeface="Cambria" panose="02040503050406030204" pitchFamily="18" charset="0"/>
                 <a:cs typeface="Arial" panose="020B0604020202020204" pitchFamily="34" charset="0"/>
@@ -3721,7 +3721,7 @@
               <a:t>, January. </a:t>
             </a:r>
             <a:r>
-              <a:rPr lang="en-US" sz="800" dirty="0">
+              <a:rPr lang="en-US" sz="700" dirty="0">
                 <a:latin typeface="Arial" panose="020B0604020202020204" pitchFamily="34" charset="0"/>
                 <a:ea typeface="Cambria" panose="02040503050406030204" pitchFamily="18" charset="0"/>
                 <a:cs typeface="Arial" panose="020B0604020202020204" pitchFamily="34" charset="0"/>
@@ -3730,7 +3730,7 @@
               <a:t>https://doi.org/10.1177/0165025420981642</a:t>
             </a:r>
             <a:r>
-              <a:rPr lang="en-US" sz="800" dirty="0">
+              <a:rPr lang="en-US" sz="700" dirty="0">
                 <a:latin typeface="Arial" panose="020B0604020202020204" pitchFamily="34" charset="0"/>
                 <a:ea typeface="Cambria" panose="02040503050406030204" pitchFamily="18" charset="0"/>
                 <a:cs typeface="Arial" panose="020B0604020202020204" pitchFamily="34" charset="0"/>
@@ -3745,7 +3745,7 @@
               </a:spcAft>
             </a:pPr>
             <a:r>
-              <a:rPr lang="en-US" sz="800" dirty="0">
+              <a:rPr lang="en-US" sz="700" dirty="0">
                 <a:latin typeface="Arial" panose="020B0604020202020204" pitchFamily="34" charset="0"/>
                 <a:ea typeface="Cambria" panose="02040503050406030204" pitchFamily="18" charset="0"/>
                 <a:cs typeface="Arial" panose="020B0604020202020204" pitchFamily="34" charset="0"/>
@@ -3753,7 +3753,7 @@
               <a:t>Ma, Julie, Andrew C. Grogan-Kaylor, Garrett T. Pace, Kaitlin P. Ward, and Shawna J. Lee. 2022. “The association between spanking and physical abuse of young children in 56 low- and middle-income countries.” </a:t>
             </a:r>
             <a:r>
-              <a:rPr lang="en-US" sz="800" i="1" dirty="0">
+              <a:rPr lang="en-US" sz="700" i="1" dirty="0">
                 <a:latin typeface="Arial" panose="020B0604020202020204" pitchFamily="34" charset="0"/>
                 <a:ea typeface="Cambria" panose="02040503050406030204" pitchFamily="18" charset="0"/>
                 <a:cs typeface="Arial" panose="020B0604020202020204" pitchFamily="34" charset="0"/>
@@ -3761,7 +3761,7 @@
               <a:t>Child Abuse &amp; Neglect</a:t>
             </a:r>
             <a:r>
-              <a:rPr lang="en-US" sz="800" dirty="0">
+              <a:rPr lang="en-US" sz="700" dirty="0">
                 <a:latin typeface="Arial" panose="020B0604020202020204" pitchFamily="34" charset="0"/>
                 <a:ea typeface="Cambria" panose="02040503050406030204" pitchFamily="18" charset="0"/>
                 <a:cs typeface="Arial" panose="020B0604020202020204" pitchFamily="34" charset="0"/>
@@ -3769,7 +3769,7 @@
               <a:t> 129 (July): 105662. </a:t>
             </a:r>
             <a:r>
-              <a:rPr lang="en-US" sz="800" dirty="0">
+              <a:rPr lang="en-US" sz="700" dirty="0">
                 <a:latin typeface="Arial" panose="020B0604020202020204" pitchFamily="34" charset="0"/>
                 <a:ea typeface="Cambria" panose="02040503050406030204" pitchFamily="18" charset="0"/>
                 <a:cs typeface="Arial" panose="020B0604020202020204" pitchFamily="34" charset="0"/>
@@ -3778,7 +3778,7 @@
               <a:t>https://doi.org/10.1016/j.chiabu.2022.105662</a:t>
             </a:r>
             <a:r>
-              <a:rPr lang="en-US" sz="800" dirty="0">
+              <a:rPr lang="en-US" sz="700" dirty="0">
                 <a:latin typeface="Arial" panose="020B0604020202020204" pitchFamily="34" charset="0"/>
                 <a:ea typeface="Cambria" panose="02040503050406030204" pitchFamily="18" charset="0"/>
                 <a:cs typeface="Arial" panose="020B0604020202020204" pitchFamily="34" charset="0"/>
@@ -3793,7 +3793,7 @@
               </a:spcAft>
             </a:pPr>
             <a:r>
-              <a:rPr lang="en-US" sz="800" dirty="0">
+              <a:rPr lang="en-US" sz="700" dirty="0">
                 <a:latin typeface="Arial" panose="020B0604020202020204" pitchFamily="34" charset="0"/>
                 <a:ea typeface="Cambria" panose="02040503050406030204" pitchFamily="18" charset="0"/>
                 <a:cs typeface="Arial" panose="020B0604020202020204" pitchFamily="34" charset="0"/>
@@ -3801,7 +3801,7 @@
               <a:t>Pace, Garrett T., Shawna J. Lee, and Andrew Grogan-Kaylor. 2019. “Spanking and young children’s socioemotional development in low- and middle-income countries.” </a:t>
             </a:r>
             <a:r>
-              <a:rPr lang="en-US" sz="800" i="1" dirty="0">
+              <a:rPr lang="en-US" sz="700" i="1" dirty="0">
                 <a:latin typeface="Arial" panose="020B0604020202020204" pitchFamily="34" charset="0"/>
                 <a:ea typeface="Cambria" panose="02040503050406030204" pitchFamily="18" charset="0"/>
                 <a:cs typeface="Arial" panose="020B0604020202020204" pitchFamily="34" charset="0"/>
@@ -3809,7 +3809,7 @@
               <a:t>Child Abuse and Neglect</a:t>
             </a:r>
             <a:r>
-              <a:rPr lang="en-US" sz="800" dirty="0">
+              <a:rPr lang="en-US" sz="700" dirty="0">
                 <a:latin typeface="Arial" panose="020B0604020202020204" pitchFamily="34" charset="0"/>
                 <a:ea typeface="Cambria" panose="02040503050406030204" pitchFamily="18" charset="0"/>
                 <a:cs typeface="Arial" panose="020B0604020202020204" pitchFamily="34" charset="0"/>
@@ -3817,7 +3817,7 @@
               <a:t> 88: 84–95. </a:t>
             </a:r>
             <a:r>
-              <a:rPr lang="en-US" sz="800" dirty="0">
+              <a:rPr lang="en-US" sz="700" dirty="0">
                 <a:latin typeface="Arial" panose="020B0604020202020204" pitchFamily="34" charset="0"/>
                 <a:ea typeface="Cambria" panose="02040503050406030204" pitchFamily="18" charset="0"/>
                 <a:cs typeface="Arial" panose="020B0604020202020204" pitchFamily="34" charset="0"/>
@@ -3826,7 +3826,7 @@
               <a:t>https://doi.org/10.1016/j.chiabu.2018.11.003</a:t>
             </a:r>
             <a:r>
-              <a:rPr lang="en-US" sz="800" dirty="0">
+              <a:rPr lang="en-US" sz="700" dirty="0">
                 <a:latin typeface="Arial" panose="020B0604020202020204" pitchFamily="34" charset="0"/>
                 <a:ea typeface="Cambria" panose="02040503050406030204" pitchFamily="18" charset="0"/>
                 <a:cs typeface="Arial" panose="020B0604020202020204" pitchFamily="34" charset="0"/>
@@ -3841,7 +3841,7 @@
               </a:spcAft>
             </a:pPr>
             <a:r>
-              <a:rPr lang="en-US" sz="800" dirty="0">
+              <a:rPr lang="en-US" sz="700" dirty="0">
                 <a:latin typeface="Arial" panose="020B0604020202020204" pitchFamily="34" charset="0"/>
                 <a:ea typeface="Cambria" panose="02040503050406030204" pitchFamily="18" charset="0"/>
                 <a:cs typeface="Arial" panose="020B0604020202020204" pitchFamily="34" charset="0"/>
@@ -3849,7 +3849,7 @@
               <a:t>Ward, Kaitlin P., Andrew C. Grogan-Kaylor, Garrett T. Pace, Jorge </a:t>
             </a:r>
             <a:r>
-              <a:rPr lang="en-US" sz="800" dirty="0" err="1">
+              <a:rPr lang="en-US" sz="700" dirty="0" err="1">
                 <a:latin typeface="Arial" panose="020B0604020202020204" pitchFamily="34" charset="0"/>
                 <a:ea typeface="Cambria" panose="02040503050406030204" pitchFamily="18" charset="0"/>
                 <a:cs typeface="Arial" panose="020B0604020202020204" pitchFamily="34" charset="0"/>
@@ -3857,7 +3857,7 @@
               <a:t>Cuartas</a:t>
             </a:r>
             <a:r>
-              <a:rPr lang="en-US" sz="800" dirty="0">
+              <a:rPr lang="en-US" sz="700" dirty="0">
                 <a:latin typeface="Arial" panose="020B0604020202020204" pitchFamily="34" charset="0"/>
                 <a:ea typeface="Cambria" panose="02040503050406030204" pitchFamily="18" charset="0"/>
                 <a:cs typeface="Arial" panose="020B0604020202020204" pitchFamily="34" charset="0"/>
@@ -3865,7 +3865,7 @@
               <a:t>, and Shawna J. Lee. 2021a. “A Multilevel Ecological Analysis of the Predictors of Spanking Across 65 Countries.” </a:t>
             </a:r>
             <a:r>
-              <a:rPr lang="en-US" sz="800" i="1" dirty="0">
+              <a:rPr lang="en-US" sz="700" i="1" dirty="0">
                 <a:latin typeface="Arial" panose="020B0604020202020204" pitchFamily="34" charset="0"/>
                 <a:ea typeface="Cambria" panose="02040503050406030204" pitchFamily="18" charset="0"/>
                 <a:cs typeface="Arial" panose="020B0604020202020204" pitchFamily="34" charset="0"/>
@@ -3873,7 +3873,7 @@
               <a:t>BMJ Open</a:t>
             </a:r>
             <a:r>
-              <a:rPr lang="en-US" sz="800" dirty="0">
+              <a:rPr lang="en-US" sz="700" dirty="0">
                 <a:latin typeface="Arial" panose="020B0604020202020204" pitchFamily="34" charset="0"/>
                 <a:ea typeface="Cambria" panose="02040503050406030204" pitchFamily="18" charset="0"/>
                 <a:cs typeface="Arial" panose="020B0604020202020204" pitchFamily="34" charset="0"/>
@@ -3881,7 +3881,7 @@
               <a:t> 11 (e046075). </a:t>
             </a:r>
             <a:r>
-              <a:rPr lang="en-US" sz="800" dirty="0">
+              <a:rPr lang="en-US" sz="700" dirty="0">
                 <a:latin typeface="Arial" panose="020B0604020202020204" pitchFamily="34" charset="0"/>
                 <a:ea typeface="Cambria" panose="02040503050406030204" pitchFamily="18" charset="0"/>
                 <a:cs typeface="Arial" panose="020B0604020202020204" pitchFamily="34" charset="0"/>
@@ -3890,7 +3890,7 @@
               <a:t>https://doi.org/10.1136/bmjopen-2020-046075</a:t>
             </a:r>
             <a:r>
-              <a:rPr lang="en-US" sz="800" dirty="0">
+              <a:rPr lang="en-US" sz="700" dirty="0">
                 <a:latin typeface="Arial" panose="020B0604020202020204" pitchFamily="34" charset="0"/>
                 <a:ea typeface="Cambria" panose="02040503050406030204" pitchFamily="18" charset="0"/>
                 <a:cs typeface="Arial" panose="020B0604020202020204" pitchFamily="34" charset="0"/>
@@ -3905,7 +3905,7 @@
               </a:spcAft>
             </a:pPr>
             <a:r>
-              <a:rPr lang="en-US" sz="800" dirty="0">
+              <a:rPr lang="en-US" sz="700" dirty="0">
                 <a:latin typeface="Arial" panose="020B0604020202020204" pitchFamily="34" charset="0"/>
                 <a:ea typeface="Cambria" panose="02040503050406030204" pitchFamily="18" charset="0"/>
                 <a:cs typeface="Arial" panose="020B0604020202020204" pitchFamily="34" charset="0"/>
@@ -3913,7 +3913,7 @@
               <a:t>Ward, Kaitlin P, Andrew Grogan-Kaylor, Julie Ma, Garrett T Pace, and Shawna J Lee. 2021b. “Associations Between 11 Parental Discipline Behaviors and Child Outcomes Across 60 Countries.” </a:t>
             </a:r>
             <a:r>
-              <a:rPr lang="en-US" sz="800" dirty="0" err="1">
+              <a:rPr lang="en-US" sz="700" dirty="0" err="1">
                 <a:latin typeface="Arial" panose="020B0604020202020204" pitchFamily="34" charset="0"/>
                 <a:ea typeface="Cambria" panose="02040503050406030204" pitchFamily="18" charset="0"/>
                 <a:cs typeface="Arial" panose="020B0604020202020204" pitchFamily="34" charset="0"/>
@@ -3921,7 +3921,7 @@
               <a:t>PsyArXiv</a:t>
             </a:r>
             <a:r>
-              <a:rPr lang="en-US" sz="800" dirty="0">
+              <a:rPr lang="en-US" sz="700" dirty="0">
                 <a:latin typeface="Arial" panose="020B0604020202020204" pitchFamily="34" charset="0"/>
                 <a:ea typeface="Cambria" panose="02040503050406030204" pitchFamily="18" charset="0"/>
                 <a:cs typeface="Arial" panose="020B0604020202020204" pitchFamily="34" charset="0"/>
@@ -3929,7 +3929,7 @@
               <a:t>. </a:t>
             </a:r>
             <a:r>
-              <a:rPr lang="en-US" sz="800" dirty="0">
+              <a:rPr lang="en-US" sz="700" dirty="0">
                 <a:latin typeface="Arial" panose="020B0604020202020204" pitchFamily="34" charset="0"/>
                 <a:ea typeface="Cambria" panose="02040503050406030204" pitchFamily="18" charset="0"/>
                 <a:cs typeface="Arial" panose="020B0604020202020204" pitchFamily="34" charset="0"/>
@@ -3938,7 +3938,7 @@
               <a:t>https://doi.org/10.31234/osf.io/f5t8x</a:t>
             </a:r>
             <a:r>
-              <a:rPr lang="en-US" sz="800" dirty="0">
+              <a:rPr lang="en-US" sz="700" dirty="0">
                 <a:latin typeface="Arial" panose="020B0604020202020204" pitchFamily="34" charset="0"/>
                 <a:ea typeface="Cambria" panose="02040503050406030204" pitchFamily="18" charset="0"/>
                 <a:cs typeface="Arial" panose="020B0604020202020204" pitchFamily="34" charset="0"/>
@@ -3953,7 +3953,7 @@
               </a:spcAft>
             </a:pPr>
             <a:r>
-              <a:rPr lang="en-US" sz="800" dirty="0">
+              <a:rPr lang="en-US" sz="700" dirty="0">
                 <a:latin typeface="Arial" panose="020B0604020202020204" pitchFamily="34" charset="0"/>
                 <a:ea typeface="Cambria" panose="02040503050406030204" pitchFamily="18" charset="0"/>
                 <a:cs typeface="Arial" panose="020B0604020202020204" pitchFamily="34" charset="0"/>
@@ -3961,7 +3961,7 @@
               <a:t>Ward, Kaitlin P., Shawna J. Lee, Andrew C. Grogan-Kaylor, Julie Ma, and Garrett T. Pace. 2022. “Patterns of Caregiver Aggressive and Nonaggressive Discipline Toward Young Children in Low- and Middle-Income Countries: A Latent Class Approach.” </a:t>
             </a:r>
             <a:r>
-              <a:rPr lang="en-US" sz="800" i="1" dirty="0">
+              <a:rPr lang="en-US" sz="700" i="1" dirty="0">
                 <a:latin typeface="Arial" panose="020B0604020202020204" pitchFamily="34" charset="0"/>
                 <a:ea typeface="Cambria" panose="02040503050406030204" pitchFamily="18" charset="0"/>
                 <a:cs typeface="Arial" panose="020B0604020202020204" pitchFamily="34" charset="0"/>
@@ -3969,7 +3969,7 @@
               <a:t>Child Abuse &amp; Neglect</a:t>
             </a:r>
             <a:r>
-              <a:rPr lang="en-US" sz="800" dirty="0">
+              <a:rPr lang="en-US" sz="700" dirty="0">
                 <a:latin typeface="Arial" panose="020B0604020202020204" pitchFamily="34" charset="0"/>
                 <a:ea typeface="Cambria" panose="02040503050406030204" pitchFamily="18" charset="0"/>
                 <a:cs typeface="Arial" panose="020B0604020202020204" pitchFamily="34" charset="0"/>
@@ -3977,7 +3977,7 @@
               <a:t> 128. https://doi.org/</a:t>
             </a:r>
             <a:r>
-              <a:rPr lang="en-US" sz="800" dirty="0">
+              <a:rPr lang="en-US" sz="700" dirty="0">
                 <a:latin typeface="Arial" panose="020B0604020202020204" pitchFamily="34" charset="0"/>
                 <a:ea typeface="Cambria" panose="02040503050406030204" pitchFamily="18" charset="0"/>
                 <a:cs typeface="Arial" panose="020B0604020202020204" pitchFamily="34" charset="0"/>
@@ -3986,7 +3986,7 @@
               <a:t>https://doi.org/10.1016/j.chiabu.2022.105606</a:t>
             </a:r>
             <a:r>
-              <a:rPr lang="en-US" sz="800" dirty="0">
+              <a:rPr lang="en-US" sz="700" dirty="0">
                 <a:latin typeface="Arial" panose="020B0604020202020204" pitchFamily="34" charset="0"/>
                 <a:ea typeface="Cambria" panose="02040503050406030204" pitchFamily="18" charset="0"/>
                 <a:cs typeface="Arial" panose="020B0604020202020204" pitchFamily="34" charset="0"/>

</xml_diff>

<commit_message>
many tweaks only possible with GUI
</commit_message>
<xml_diff>
--- a/MICS-infographic/MICS-infographic.pptx
+++ b/MICS-infographic/MICS-infographic.pptx
@@ -197,7 +197,7 @@
           <a:p>
             <a:fld id="{A7349FAD-4586-444E-B813-19B68E60165B}" type="datetimeFigureOut">
               <a:rPr lang="en-US" smtClean="0"/>
-              <a:t>7/19/2022</a:t>
+              <a:t>7/20/2022</a:t>
             </a:fld>
             <a:endParaRPr lang="en-US"/>
           </a:p>
@@ -596,7 +596,7 @@
           <a:p>
             <a:fld id="{6097C439-7116-4AF9-8B0C-274A6D902FE8}" type="datetimeFigureOut">
               <a:rPr lang="en-US" smtClean="0"/>
-              <a:t>7/19/2022</a:t>
+              <a:t>7/20/2022</a:t>
             </a:fld>
             <a:endParaRPr lang="en-US"/>
           </a:p>
@@ -766,7 +766,7 @@
           <a:p>
             <a:fld id="{6097C439-7116-4AF9-8B0C-274A6D902FE8}" type="datetimeFigureOut">
               <a:rPr lang="en-US" smtClean="0"/>
-              <a:t>7/19/2022</a:t>
+              <a:t>7/20/2022</a:t>
             </a:fld>
             <a:endParaRPr lang="en-US"/>
           </a:p>
@@ -946,7 +946,7 @@
           <a:p>
             <a:fld id="{6097C439-7116-4AF9-8B0C-274A6D902FE8}" type="datetimeFigureOut">
               <a:rPr lang="en-US" smtClean="0"/>
-              <a:t>7/19/2022</a:t>
+              <a:t>7/20/2022</a:t>
             </a:fld>
             <a:endParaRPr lang="en-US"/>
           </a:p>
@@ -1116,7 +1116,7 @@
           <a:p>
             <a:fld id="{6097C439-7116-4AF9-8B0C-274A6D902FE8}" type="datetimeFigureOut">
               <a:rPr lang="en-US" smtClean="0"/>
-              <a:t>7/19/2022</a:t>
+              <a:t>7/20/2022</a:t>
             </a:fld>
             <a:endParaRPr lang="en-US"/>
           </a:p>
@@ -1360,7 +1360,7 @@
           <a:p>
             <a:fld id="{6097C439-7116-4AF9-8B0C-274A6D902FE8}" type="datetimeFigureOut">
               <a:rPr lang="en-US" smtClean="0"/>
-              <a:t>7/19/2022</a:t>
+              <a:t>7/20/2022</a:t>
             </a:fld>
             <a:endParaRPr lang="en-US"/>
           </a:p>
@@ -1592,7 +1592,7 @@
           <a:p>
             <a:fld id="{6097C439-7116-4AF9-8B0C-274A6D902FE8}" type="datetimeFigureOut">
               <a:rPr lang="en-US" smtClean="0"/>
-              <a:t>7/19/2022</a:t>
+              <a:t>7/20/2022</a:t>
             </a:fld>
             <a:endParaRPr lang="en-US"/>
           </a:p>
@@ -1959,7 +1959,7 @@
           <a:p>
             <a:fld id="{6097C439-7116-4AF9-8B0C-274A6D902FE8}" type="datetimeFigureOut">
               <a:rPr lang="en-US" smtClean="0"/>
-              <a:t>7/19/2022</a:t>
+              <a:t>7/20/2022</a:t>
             </a:fld>
             <a:endParaRPr lang="en-US"/>
           </a:p>
@@ -2077,7 +2077,7 @@
           <a:p>
             <a:fld id="{6097C439-7116-4AF9-8B0C-274A6D902FE8}" type="datetimeFigureOut">
               <a:rPr lang="en-US" smtClean="0"/>
-              <a:t>7/19/2022</a:t>
+              <a:t>7/20/2022</a:t>
             </a:fld>
             <a:endParaRPr lang="en-US"/>
           </a:p>
@@ -2172,7 +2172,7 @@
           <a:p>
             <a:fld id="{6097C439-7116-4AF9-8B0C-274A6D902FE8}" type="datetimeFigureOut">
               <a:rPr lang="en-US" smtClean="0"/>
-              <a:t>7/19/2022</a:t>
+              <a:t>7/20/2022</a:t>
             </a:fld>
             <a:endParaRPr lang="en-US"/>
           </a:p>
@@ -2449,7 +2449,7 @@
           <a:p>
             <a:fld id="{6097C439-7116-4AF9-8B0C-274A6D902FE8}" type="datetimeFigureOut">
               <a:rPr lang="en-US" smtClean="0"/>
-              <a:t>7/19/2022</a:t>
+              <a:t>7/20/2022</a:t>
             </a:fld>
             <a:endParaRPr lang="en-US"/>
           </a:p>
@@ -2706,7 +2706,7 @@
           <a:p>
             <a:fld id="{6097C439-7116-4AF9-8B0C-274A6D902FE8}" type="datetimeFigureOut">
               <a:rPr lang="en-US" smtClean="0"/>
-              <a:t>7/19/2022</a:t>
+              <a:t>7/20/2022</a:t>
             </a:fld>
             <a:endParaRPr lang="en-US"/>
           </a:p>
@@ -2919,7 +2919,7 @@
           <a:p>
             <a:fld id="{6097C439-7116-4AF9-8B0C-274A6D902FE8}" type="datetimeFigureOut">
               <a:rPr lang="en-US" smtClean="0"/>
-              <a:t>7/19/2022</a:t>
+              <a:t>7/20/2022</a:t>
             </a:fld>
             <a:endParaRPr lang="en-US"/>
           </a:p>
@@ -3452,8 +3452,8 @@
         </p:nvSpPr>
         <p:spPr>
           <a:xfrm>
-            <a:off x="464653" y="3409737"/>
-            <a:ext cx="2830167" cy="5332229"/>
+            <a:off x="471487" y="3280530"/>
+            <a:ext cx="2823333" cy="5786199"/>
           </a:xfrm>
           <a:prstGeom prst="rect">
             <a:avLst/>
@@ -3467,11 +3467,14 @@
           <a:p>
             <a:pPr>
               <a:spcBef>
-                <a:spcPts val="2400"/>
+                <a:spcPts val="600"/>
               </a:spcBef>
+              <a:spcAft>
+                <a:spcPts val="600"/>
+              </a:spcAft>
             </a:pPr>
             <a:r>
-              <a:rPr lang="en-US" sz="1400" b="1" kern="0" dirty="0">
+              <a:rPr lang="en-US" sz="1200" b="1" kern="0" dirty="0">
                 <a:solidFill>
                   <a:srgbClr val="FF0000"/>
                 </a:solidFill>
@@ -3485,14 +3488,14 @@
           <a:p>
             <a:pPr>
               <a:spcBef>
-                <a:spcPts val="900"/>
+                <a:spcPts val="600"/>
               </a:spcBef>
               <a:spcAft>
-                <a:spcPts val="900"/>
+                <a:spcPts val="600"/>
               </a:spcAft>
             </a:pPr>
             <a:r>
-              <a:rPr lang="en-US" sz="1100" dirty="0">
+              <a:rPr lang="en-US" sz="1050" dirty="0">
                 <a:latin typeface="Arial" panose="020B0604020202020204" pitchFamily="34" charset="0"/>
                 <a:ea typeface="Cambria" panose="02040503050406030204" pitchFamily="18" charset="0"/>
                 <a:cs typeface="Arial" panose="020B0604020202020204" pitchFamily="34" charset="0"/>
@@ -3503,11 +3506,14 @@
           <a:p>
             <a:pPr>
               <a:spcBef>
-                <a:spcPts val="1200"/>
+                <a:spcPts val="600"/>
               </a:spcBef>
+              <a:spcAft>
+                <a:spcPts val="600"/>
+              </a:spcAft>
             </a:pPr>
             <a:r>
-              <a:rPr lang="en-US" sz="1400" b="1" kern="0" dirty="0">
+              <a:rPr lang="en-US" sz="1200" b="1" kern="0" dirty="0">
                 <a:solidFill>
                   <a:srgbClr val="FF0000"/>
                 </a:solidFill>
@@ -3521,14 +3527,14 @@
           <a:p>
             <a:pPr>
               <a:spcBef>
-                <a:spcPts val="900"/>
+                <a:spcPts val="600"/>
               </a:spcBef>
               <a:spcAft>
-                <a:spcPts val="900"/>
+                <a:spcPts val="600"/>
               </a:spcAft>
             </a:pPr>
             <a:r>
-              <a:rPr lang="en-US" sz="1100" dirty="0">
+              <a:rPr lang="en-US" sz="1050" dirty="0">
                 <a:latin typeface="Arial" panose="020B0604020202020204" pitchFamily="34" charset="0"/>
                 <a:ea typeface="Cambria" panose="02040503050406030204" pitchFamily="18" charset="0"/>
                 <a:cs typeface="Arial" panose="020B0604020202020204" pitchFamily="34" charset="0"/>
@@ -3539,11 +3545,14 @@
           <a:p>
             <a:pPr>
               <a:spcBef>
-                <a:spcPts val="1200"/>
+                <a:spcPts val="600"/>
               </a:spcBef>
+              <a:spcAft>
+                <a:spcPts val="600"/>
+              </a:spcAft>
             </a:pPr>
             <a:r>
-              <a:rPr lang="en-US" sz="1400" b="1" kern="0" dirty="0">
+              <a:rPr lang="en-US" sz="1200" b="1" kern="0" dirty="0">
                 <a:solidFill>
                   <a:srgbClr val="FF0000"/>
                 </a:solidFill>
@@ -3557,29 +3566,92 @@
           <a:p>
             <a:pPr>
               <a:spcBef>
-                <a:spcPts val="900"/>
+                <a:spcPts val="600"/>
               </a:spcBef>
               <a:spcAft>
-                <a:spcPts val="900"/>
+                <a:spcPts val="600"/>
               </a:spcAft>
             </a:pPr>
             <a:r>
-              <a:rPr lang="en-US" sz="1100" dirty="0">
+              <a:rPr lang="en-US" sz="1050" dirty="0">
                 <a:latin typeface="Arial" panose="020B0604020202020204" pitchFamily="34" charset="0"/>
                 <a:ea typeface="Cambria" panose="02040503050406030204" pitchFamily="18" charset="0"/>
                 <a:cs typeface="Arial" panose="020B0604020202020204" pitchFamily="34" charset="0"/>
               </a:rPr>
-              <a:t>Though common, these parenting behaviors are consistently associated with decreases in child socio-emotional development &amp; with increases in child aggression.</a:t>
+              <a:t>Though common, these parenting behaviors are consistently associated with decreases in child socio-emotional development &amp; with increases in child aggression</a:t>
+            </a:r>
+            <a:r>
+              <a:rPr lang="en-US" sz="1050" dirty="0" smtClean="0">
+                <a:latin typeface="Arial" panose="020B0604020202020204" pitchFamily="34" charset="0"/>
+                <a:ea typeface="Cambria" panose="02040503050406030204" pitchFamily="18" charset="0"/>
+                <a:cs typeface="Arial" panose="020B0604020202020204" pitchFamily="34" charset="0"/>
+              </a:rPr>
+              <a:t>.</a:t>
             </a:r>
           </a:p>
           <a:p>
             <a:pPr>
               <a:spcBef>
-                <a:spcPts val="1200"/>
+                <a:spcPts val="600"/>
               </a:spcBef>
+              <a:spcAft>
+                <a:spcPts val="600"/>
+              </a:spcAft>
             </a:pPr>
             <a:r>
-              <a:rPr lang="en-US" sz="1400" b="1" kern="0" dirty="0">
+              <a:rPr lang="en-US" sz="1200" b="1" kern="0" dirty="0">
+                <a:solidFill>
+                  <a:srgbClr val="FF0000"/>
+                </a:solidFill>
+                <a:latin typeface="Arial" panose="020B0604020202020204" pitchFamily="34" charset="0"/>
+                <a:ea typeface="Times New Roman" panose="02020603050405020304" pitchFamily="18" charset="0"/>
+                <a:cs typeface="Arial" panose="020B0604020202020204" pitchFamily="34" charset="0"/>
+              </a:rPr>
+              <a:t>Child Physical Abuse</a:t>
+            </a:r>
+          </a:p>
+          <a:p>
+            <a:pPr>
+              <a:spcBef>
+                <a:spcPts val="600"/>
+              </a:spcBef>
+              <a:spcAft>
+                <a:spcPts val="600"/>
+              </a:spcAft>
+            </a:pPr>
+            <a:r>
+              <a:rPr lang="en-US" sz="1050" dirty="0">
+                <a:latin typeface="Arial" panose="020B0604020202020204" pitchFamily="34" charset="0"/>
+                <a:ea typeface="Cambria" panose="02040503050406030204" pitchFamily="18" charset="0"/>
+                <a:cs typeface="Arial" panose="020B0604020202020204" pitchFamily="34" charset="0"/>
+              </a:rPr>
+              <a:t>Simulations with MICS data suggest that eliminating the use of physical punishment would be met with a large reduction in the amount of physical child abuse</a:t>
+            </a:r>
+            <a:r>
+              <a:rPr lang="en-US" sz="1050" dirty="0" smtClean="0">
+                <a:latin typeface="Arial" panose="020B0604020202020204" pitchFamily="34" charset="0"/>
+                <a:ea typeface="Cambria" panose="02040503050406030204" pitchFamily="18" charset="0"/>
+                <a:cs typeface="Arial" panose="020B0604020202020204" pitchFamily="34" charset="0"/>
+              </a:rPr>
+              <a:t>.</a:t>
+            </a:r>
+            <a:endParaRPr lang="en-US" sz="1050" dirty="0">
+              <a:latin typeface="Arial" panose="020B0604020202020204" pitchFamily="34" charset="0"/>
+              <a:ea typeface="Cambria" panose="02040503050406030204" pitchFamily="18" charset="0"/>
+              <a:cs typeface="Arial" panose="020B0604020202020204" pitchFamily="34" charset="0"/>
+            </a:endParaRPr>
+          </a:p>
+          <a:p>
+            <a:pPr>
+              <a:spcBef>
+                <a:spcPts val="600"/>
+              </a:spcBef>
+              <a:spcAft>
+                <a:spcPts val="600"/>
+              </a:spcAft>
+            </a:pPr>
+            <a:r>
+              <a:rPr lang="en-US" sz="1200" b="1" kern="0" dirty="0">
                 <a:solidFill>
                   <a:srgbClr val="0070C0"/>
                 </a:solidFill>
@@ -3593,14 +3665,14 @@
           <a:p>
             <a:pPr>
               <a:spcBef>
-                <a:spcPts val="900"/>
+                <a:spcPts val="600"/>
               </a:spcBef>
               <a:spcAft>
-                <a:spcPts val="900"/>
+                <a:spcPts val="600"/>
               </a:spcAft>
             </a:pPr>
             <a:r>
-              <a:rPr lang="en-US" sz="1100" dirty="0">
+              <a:rPr lang="en-US" sz="1050" dirty="0">
                 <a:latin typeface="Arial" panose="020B0604020202020204" pitchFamily="34" charset="0"/>
                 <a:ea typeface="Cambria" panose="02040503050406030204" pitchFamily="18" charset="0"/>
                 <a:cs typeface="Arial" panose="020B0604020202020204" pitchFamily="34" charset="0"/>
@@ -3625,7 +3697,7 @@
         </p:blipFill>
         <p:spPr bwMode="auto">
           <a:xfrm>
-            <a:off x="3429001" y="3403516"/>
+            <a:off x="3429001" y="3274309"/>
             <a:ext cx="3165611" cy="1731746"/>
           </a:xfrm>
           <a:prstGeom prst="rect">
@@ -3647,7 +3719,7 @@
         </p:nvSpPr>
         <p:spPr>
           <a:xfrm>
-            <a:off x="3429001" y="5142828"/>
+            <a:off x="3429001" y="4874469"/>
             <a:ext cx="3165611" cy="3749744"/>
           </a:xfrm>
           <a:prstGeom prst="rect">
@@ -4006,16 +4078,23 @@
             <p:ph type="dt" sz="half" idx="10"/>
           </p:nvPr>
         </p:nvSpPr>
-        <p:spPr/>
-        <p:txBody>
-          <a:bodyPr/>
-          <a:lstStyle/>
-          <a:p>
+        <p:spPr>
+          <a:xfrm>
+            <a:off x="2590386" y="8892572"/>
+            <a:ext cx="1543050" cy="204935"/>
+          </a:xfrm>
+        </p:spPr>
+        <p:txBody>
+          <a:bodyPr/>
+          <a:lstStyle/>
+          <a:p>
+            <a:pPr algn="ctr"/>
             <a:fld id="{8757FC28-EF30-4B9A-91BE-44A2E750A998}" type="datetime1">
               <a:rPr lang="en-US" smtClean="0"/>
-              <a:t>7/19/2022</a:t>
+              <a:pPr algn="ctr"/>
+              <a:t>7/20/2022</a:t>
             </a:fld>
-            <a:endParaRPr lang="en-US"/>
+            <a:endParaRPr lang="en-US" dirty="0"/>
           </a:p>
         </p:txBody>
       </p:sp>

</xml_diff>

<commit_message>
per updates from Professor Lee
</commit_message>
<xml_diff>
--- a/MICS-infographic/MICS-infographic.pptx
+++ b/MICS-infographic/MICS-infographic.pptx
@@ -197,7 +197,7 @@
           <a:p>
             <a:fld id="{A7349FAD-4586-444E-B813-19B68E60165B}" type="datetimeFigureOut">
               <a:rPr lang="en-US" smtClean="0"/>
-              <a:t>7/20/2022</a:t>
+              <a:t>7/25/22</a:t>
             </a:fld>
             <a:endParaRPr lang="en-US"/>
           </a:p>
@@ -261,38 +261,37 @@
           <a:p>
             <a:pPr lvl="0"/>
             <a:r>
-              <a:rPr lang="en-US" smtClean="0"/>
+              <a:rPr lang="en-US"/>
               <a:t>Edit Master text styles</a:t>
             </a:r>
           </a:p>
           <a:p>
             <a:pPr lvl="1"/>
             <a:r>
-              <a:rPr lang="en-US" smtClean="0"/>
+              <a:rPr lang="en-US"/>
               <a:t>Second level</a:t>
             </a:r>
           </a:p>
           <a:p>
             <a:pPr lvl="2"/>
             <a:r>
-              <a:rPr lang="en-US" smtClean="0"/>
+              <a:rPr lang="en-US"/>
               <a:t>Third level</a:t>
             </a:r>
           </a:p>
           <a:p>
             <a:pPr lvl="3"/>
             <a:r>
-              <a:rPr lang="en-US" smtClean="0"/>
+              <a:rPr lang="en-US"/>
               <a:t>Fourth level</a:t>
             </a:r>
           </a:p>
           <a:p>
             <a:pPr lvl="4"/>
             <a:r>
-              <a:rPr lang="en-US" smtClean="0"/>
+              <a:rPr lang="en-US"/>
               <a:t>Fifth level</a:t>
             </a:r>
-            <a:endParaRPr lang="en-US"/>
           </a:p>
         </p:txBody>
       </p:sp>
@@ -507,7 +506,7 @@
           </a:lstStyle>
           <a:p>
             <a:r>
-              <a:rPr lang="en-US" smtClean="0"/>
+              <a:rPr lang="en-US"/>
               <a:t>Click to edit Master title style</a:t>
             </a:r>
             <a:endParaRPr lang="en-US" dirty="0"/>
@@ -572,7 +571,7 @@
           </a:lstStyle>
           <a:p>
             <a:r>
-              <a:rPr lang="en-US" smtClean="0"/>
+              <a:rPr lang="en-US"/>
               <a:t>Click to edit Master subtitle style</a:t>
             </a:r>
             <a:endParaRPr lang="en-US" dirty="0"/>
@@ -596,7 +595,7 @@
           <a:p>
             <a:fld id="{6097C439-7116-4AF9-8B0C-274A6D902FE8}" type="datetimeFigureOut">
               <a:rPr lang="en-US" smtClean="0"/>
-              <a:t>7/20/2022</a:t>
+              <a:t>7/25/22</a:t>
             </a:fld>
             <a:endParaRPr lang="en-US"/>
           </a:p>
@@ -690,7 +689,7 @@
           <a:lstStyle/>
           <a:p>
             <a:r>
-              <a:rPr lang="en-US" smtClean="0"/>
+              <a:rPr lang="en-US"/>
               <a:t>Click to edit Master title style</a:t>
             </a:r>
             <a:endParaRPr lang="en-US" dirty="0"/>
@@ -714,35 +713,35 @@
           <a:p>
             <a:pPr lvl="0"/>
             <a:r>
-              <a:rPr lang="en-US" smtClean="0"/>
+              <a:rPr lang="en-US"/>
               <a:t>Edit Master text styles</a:t>
             </a:r>
           </a:p>
           <a:p>
             <a:pPr lvl="1"/>
             <a:r>
-              <a:rPr lang="en-US" smtClean="0"/>
+              <a:rPr lang="en-US"/>
               <a:t>Second level</a:t>
             </a:r>
           </a:p>
           <a:p>
             <a:pPr lvl="2"/>
             <a:r>
-              <a:rPr lang="en-US" smtClean="0"/>
+              <a:rPr lang="en-US"/>
               <a:t>Third level</a:t>
             </a:r>
           </a:p>
           <a:p>
             <a:pPr lvl="3"/>
             <a:r>
-              <a:rPr lang="en-US" smtClean="0"/>
+              <a:rPr lang="en-US"/>
               <a:t>Fourth level</a:t>
             </a:r>
           </a:p>
           <a:p>
             <a:pPr lvl="4"/>
             <a:r>
-              <a:rPr lang="en-US" smtClean="0"/>
+              <a:rPr lang="en-US"/>
               <a:t>Fifth level</a:t>
             </a:r>
             <a:endParaRPr lang="en-US" dirty="0"/>
@@ -766,7 +765,7 @@
           <a:p>
             <a:fld id="{6097C439-7116-4AF9-8B0C-274A6D902FE8}" type="datetimeFigureOut">
               <a:rPr lang="en-US" smtClean="0"/>
-              <a:t>7/20/2022</a:t>
+              <a:t>7/25/22</a:t>
             </a:fld>
             <a:endParaRPr lang="en-US"/>
           </a:p>
@@ -865,7 +864,7 @@
           <a:lstStyle/>
           <a:p>
             <a:r>
-              <a:rPr lang="en-US" smtClean="0"/>
+              <a:rPr lang="en-US"/>
               <a:t>Click to edit Master title style</a:t>
             </a:r>
             <a:endParaRPr lang="en-US" dirty="0"/>
@@ -894,35 +893,35 @@
           <a:p>
             <a:pPr lvl="0"/>
             <a:r>
-              <a:rPr lang="en-US" smtClean="0"/>
+              <a:rPr lang="en-US"/>
               <a:t>Edit Master text styles</a:t>
             </a:r>
           </a:p>
           <a:p>
             <a:pPr lvl="1"/>
             <a:r>
-              <a:rPr lang="en-US" smtClean="0"/>
+              <a:rPr lang="en-US"/>
               <a:t>Second level</a:t>
             </a:r>
           </a:p>
           <a:p>
             <a:pPr lvl="2"/>
             <a:r>
-              <a:rPr lang="en-US" smtClean="0"/>
+              <a:rPr lang="en-US"/>
               <a:t>Third level</a:t>
             </a:r>
           </a:p>
           <a:p>
             <a:pPr lvl="3"/>
             <a:r>
-              <a:rPr lang="en-US" smtClean="0"/>
+              <a:rPr lang="en-US"/>
               <a:t>Fourth level</a:t>
             </a:r>
           </a:p>
           <a:p>
             <a:pPr lvl="4"/>
             <a:r>
-              <a:rPr lang="en-US" smtClean="0"/>
+              <a:rPr lang="en-US"/>
               <a:t>Fifth level</a:t>
             </a:r>
             <a:endParaRPr lang="en-US" dirty="0"/>
@@ -946,7 +945,7 @@
           <a:p>
             <a:fld id="{6097C439-7116-4AF9-8B0C-274A6D902FE8}" type="datetimeFigureOut">
               <a:rPr lang="en-US" smtClean="0"/>
-              <a:t>7/20/2022</a:t>
+              <a:t>7/25/22</a:t>
             </a:fld>
             <a:endParaRPr lang="en-US"/>
           </a:p>
@@ -1040,7 +1039,7 @@
           <a:lstStyle/>
           <a:p>
             <a:r>
-              <a:rPr lang="en-US" smtClean="0"/>
+              <a:rPr lang="en-US"/>
               <a:t>Click to edit Master title style</a:t>
             </a:r>
             <a:endParaRPr lang="en-US" dirty="0"/>
@@ -1064,35 +1063,35 @@
           <a:p>
             <a:pPr lvl="0"/>
             <a:r>
-              <a:rPr lang="en-US" smtClean="0"/>
+              <a:rPr lang="en-US"/>
               <a:t>Edit Master text styles</a:t>
             </a:r>
           </a:p>
           <a:p>
             <a:pPr lvl="1"/>
             <a:r>
-              <a:rPr lang="en-US" smtClean="0"/>
+              <a:rPr lang="en-US"/>
               <a:t>Second level</a:t>
             </a:r>
           </a:p>
           <a:p>
             <a:pPr lvl="2"/>
             <a:r>
-              <a:rPr lang="en-US" smtClean="0"/>
+              <a:rPr lang="en-US"/>
               <a:t>Third level</a:t>
             </a:r>
           </a:p>
           <a:p>
             <a:pPr lvl="3"/>
             <a:r>
-              <a:rPr lang="en-US" smtClean="0"/>
+              <a:rPr lang="en-US"/>
               <a:t>Fourth level</a:t>
             </a:r>
           </a:p>
           <a:p>
             <a:pPr lvl="4"/>
             <a:r>
-              <a:rPr lang="en-US" smtClean="0"/>
+              <a:rPr lang="en-US"/>
               <a:t>Fifth level</a:t>
             </a:r>
             <a:endParaRPr lang="en-US" dirty="0"/>
@@ -1116,7 +1115,7 @@
           <a:p>
             <a:fld id="{6097C439-7116-4AF9-8B0C-274A6D902FE8}" type="datetimeFigureOut">
               <a:rPr lang="en-US" smtClean="0"/>
-              <a:t>7/20/2022</a:t>
+              <a:t>7/25/22</a:t>
             </a:fld>
             <a:endParaRPr lang="en-US"/>
           </a:p>
@@ -1219,7 +1218,7 @@
           </a:lstStyle>
           <a:p>
             <a:r>
-              <a:rPr lang="en-US" smtClean="0"/>
+              <a:rPr lang="en-US"/>
               <a:t>Click to edit Master title style</a:t>
             </a:r>
             <a:endParaRPr lang="en-US" dirty="0"/>
@@ -1337,7 +1336,7 @@
           <a:p>
             <a:pPr lvl="0"/>
             <a:r>
-              <a:rPr lang="en-US" smtClean="0"/>
+              <a:rPr lang="en-US"/>
               <a:t>Edit Master text styles</a:t>
             </a:r>
           </a:p>
@@ -1360,7 +1359,7 @@
           <a:p>
             <a:fld id="{6097C439-7116-4AF9-8B0C-274A6D902FE8}" type="datetimeFigureOut">
               <a:rPr lang="en-US" smtClean="0"/>
-              <a:t>7/20/2022</a:t>
+              <a:t>7/25/22</a:t>
             </a:fld>
             <a:endParaRPr lang="en-US"/>
           </a:p>
@@ -1454,7 +1453,7 @@
           <a:lstStyle/>
           <a:p>
             <a:r>
-              <a:rPr lang="en-US" smtClean="0"/>
+              <a:rPr lang="en-US"/>
               <a:t>Click to edit Master title style</a:t>
             </a:r>
             <a:endParaRPr lang="en-US" dirty="0"/>
@@ -1483,35 +1482,35 @@
           <a:p>
             <a:pPr lvl="0"/>
             <a:r>
-              <a:rPr lang="en-US" smtClean="0"/>
+              <a:rPr lang="en-US"/>
               <a:t>Edit Master text styles</a:t>
             </a:r>
           </a:p>
           <a:p>
             <a:pPr lvl="1"/>
             <a:r>
-              <a:rPr lang="en-US" smtClean="0"/>
+              <a:rPr lang="en-US"/>
               <a:t>Second level</a:t>
             </a:r>
           </a:p>
           <a:p>
             <a:pPr lvl="2"/>
             <a:r>
-              <a:rPr lang="en-US" smtClean="0"/>
+              <a:rPr lang="en-US"/>
               <a:t>Third level</a:t>
             </a:r>
           </a:p>
           <a:p>
             <a:pPr lvl="3"/>
             <a:r>
-              <a:rPr lang="en-US" smtClean="0"/>
+              <a:rPr lang="en-US"/>
               <a:t>Fourth level</a:t>
             </a:r>
           </a:p>
           <a:p>
             <a:pPr lvl="4"/>
             <a:r>
-              <a:rPr lang="en-US" smtClean="0"/>
+              <a:rPr lang="en-US"/>
               <a:t>Fifth level</a:t>
             </a:r>
             <a:endParaRPr lang="en-US" dirty="0"/>
@@ -1540,35 +1539,35 @@
           <a:p>
             <a:pPr lvl="0"/>
             <a:r>
-              <a:rPr lang="en-US" smtClean="0"/>
+              <a:rPr lang="en-US"/>
               <a:t>Edit Master text styles</a:t>
             </a:r>
           </a:p>
           <a:p>
             <a:pPr lvl="1"/>
             <a:r>
-              <a:rPr lang="en-US" smtClean="0"/>
+              <a:rPr lang="en-US"/>
               <a:t>Second level</a:t>
             </a:r>
           </a:p>
           <a:p>
             <a:pPr lvl="2"/>
             <a:r>
-              <a:rPr lang="en-US" smtClean="0"/>
+              <a:rPr lang="en-US"/>
               <a:t>Third level</a:t>
             </a:r>
           </a:p>
           <a:p>
             <a:pPr lvl="3"/>
             <a:r>
-              <a:rPr lang="en-US" smtClean="0"/>
+              <a:rPr lang="en-US"/>
               <a:t>Fourth level</a:t>
             </a:r>
           </a:p>
           <a:p>
             <a:pPr lvl="4"/>
             <a:r>
-              <a:rPr lang="en-US" smtClean="0"/>
+              <a:rPr lang="en-US"/>
               <a:t>Fifth level</a:t>
             </a:r>
             <a:endParaRPr lang="en-US" dirty="0"/>
@@ -1592,7 +1591,7 @@
           <a:p>
             <a:fld id="{6097C439-7116-4AF9-8B0C-274A6D902FE8}" type="datetimeFigureOut">
               <a:rPr lang="en-US" smtClean="0"/>
-              <a:t>7/20/2022</a:t>
+              <a:t>7/25/22</a:t>
             </a:fld>
             <a:endParaRPr lang="en-US"/>
           </a:p>
@@ -1691,7 +1690,7 @@
           <a:lstStyle/>
           <a:p>
             <a:r>
-              <a:rPr lang="en-US" smtClean="0"/>
+              <a:rPr lang="en-US"/>
               <a:t>Click to edit Master title style</a:t>
             </a:r>
             <a:endParaRPr lang="en-US" dirty="0"/>
@@ -1757,7 +1756,7 @@
           <a:p>
             <a:pPr lvl="0"/>
             <a:r>
-              <a:rPr lang="en-US" smtClean="0"/>
+              <a:rPr lang="en-US"/>
               <a:t>Edit Master text styles</a:t>
             </a:r>
           </a:p>
@@ -1785,35 +1784,35 @@
           <a:p>
             <a:pPr lvl="0"/>
             <a:r>
-              <a:rPr lang="en-US" smtClean="0"/>
+              <a:rPr lang="en-US"/>
               <a:t>Edit Master text styles</a:t>
             </a:r>
           </a:p>
           <a:p>
             <a:pPr lvl="1"/>
             <a:r>
-              <a:rPr lang="en-US" smtClean="0"/>
+              <a:rPr lang="en-US"/>
               <a:t>Second level</a:t>
             </a:r>
           </a:p>
           <a:p>
             <a:pPr lvl="2"/>
             <a:r>
-              <a:rPr lang="en-US" smtClean="0"/>
+              <a:rPr lang="en-US"/>
               <a:t>Third level</a:t>
             </a:r>
           </a:p>
           <a:p>
             <a:pPr lvl="3"/>
             <a:r>
-              <a:rPr lang="en-US" smtClean="0"/>
+              <a:rPr lang="en-US"/>
               <a:t>Fourth level</a:t>
             </a:r>
           </a:p>
           <a:p>
             <a:pPr lvl="4"/>
             <a:r>
-              <a:rPr lang="en-US" smtClean="0"/>
+              <a:rPr lang="en-US"/>
               <a:t>Fifth level</a:t>
             </a:r>
             <a:endParaRPr lang="en-US" dirty="0"/>
@@ -1879,7 +1878,7 @@
           <a:p>
             <a:pPr lvl="0"/>
             <a:r>
-              <a:rPr lang="en-US" smtClean="0"/>
+              <a:rPr lang="en-US"/>
               <a:t>Edit Master text styles</a:t>
             </a:r>
           </a:p>
@@ -1907,35 +1906,35 @@
           <a:p>
             <a:pPr lvl="0"/>
             <a:r>
-              <a:rPr lang="en-US" smtClean="0"/>
+              <a:rPr lang="en-US"/>
               <a:t>Edit Master text styles</a:t>
             </a:r>
           </a:p>
           <a:p>
             <a:pPr lvl="1"/>
             <a:r>
-              <a:rPr lang="en-US" smtClean="0"/>
+              <a:rPr lang="en-US"/>
               <a:t>Second level</a:t>
             </a:r>
           </a:p>
           <a:p>
             <a:pPr lvl="2"/>
             <a:r>
-              <a:rPr lang="en-US" smtClean="0"/>
+              <a:rPr lang="en-US"/>
               <a:t>Third level</a:t>
             </a:r>
           </a:p>
           <a:p>
             <a:pPr lvl="3"/>
             <a:r>
-              <a:rPr lang="en-US" smtClean="0"/>
+              <a:rPr lang="en-US"/>
               <a:t>Fourth level</a:t>
             </a:r>
           </a:p>
           <a:p>
             <a:pPr lvl="4"/>
             <a:r>
-              <a:rPr lang="en-US" smtClean="0"/>
+              <a:rPr lang="en-US"/>
               <a:t>Fifth level</a:t>
             </a:r>
             <a:endParaRPr lang="en-US" dirty="0"/>
@@ -1959,7 +1958,7 @@
           <a:p>
             <a:fld id="{6097C439-7116-4AF9-8B0C-274A6D902FE8}" type="datetimeFigureOut">
               <a:rPr lang="en-US" smtClean="0"/>
-              <a:t>7/20/2022</a:t>
+              <a:t>7/25/22</a:t>
             </a:fld>
             <a:endParaRPr lang="en-US"/>
           </a:p>
@@ -2053,7 +2052,7 @@
           <a:lstStyle/>
           <a:p>
             <a:r>
-              <a:rPr lang="en-US" smtClean="0"/>
+              <a:rPr lang="en-US"/>
               <a:t>Click to edit Master title style</a:t>
             </a:r>
             <a:endParaRPr lang="en-US" dirty="0"/>
@@ -2077,7 +2076,7 @@
           <a:p>
             <a:fld id="{6097C439-7116-4AF9-8B0C-274A6D902FE8}" type="datetimeFigureOut">
               <a:rPr lang="en-US" smtClean="0"/>
-              <a:t>7/20/2022</a:t>
+              <a:t>7/25/22</a:t>
             </a:fld>
             <a:endParaRPr lang="en-US"/>
           </a:p>
@@ -2172,7 +2171,7 @@
           <a:p>
             <a:fld id="{6097C439-7116-4AF9-8B0C-274A6D902FE8}" type="datetimeFigureOut">
               <a:rPr lang="en-US" smtClean="0"/>
-              <a:t>7/20/2022</a:t>
+              <a:t>7/25/22</a:t>
             </a:fld>
             <a:endParaRPr lang="en-US"/>
           </a:p>
@@ -2275,7 +2274,7 @@
           </a:lstStyle>
           <a:p>
             <a:r>
-              <a:rPr lang="en-US" smtClean="0"/>
+              <a:rPr lang="en-US"/>
               <a:t>Click to edit Master title style</a:t>
             </a:r>
             <a:endParaRPr lang="en-US" dirty="0"/>
@@ -2332,35 +2331,35 @@
           <a:p>
             <a:pPr lvl="0"/>
             <a:r>
-              <a:rPr lang="en-US" smtClean="0"/>
+              <a:rPr lang="en-US"/>
               <a:t>Edit Master text styles</a:t>
             </a:r>
           </a:p>
           <a:p>
             <a:pPr lvl="1"/>
             <a:r>
-              <a:rPr lang="en-US" smtClean="0"/>
+              <a:rPr lang="en-US"/>
               <a:t>Second level</a:t>
             </a:r>
           </a:p>
           <a:p>
             <a:pPr lvl="2"/>
             <a:r>
-              <a:rPr lang="en-US" smtClean="0"/>
+              <a:rPr lang="en-US"/>
               <a:t>Third level</a:t>
             </a:r>
           </a:p>
           <a:p>
             <a:pPr lvl="3"/>
             <a:r>
-              <a:rPr lang="en-US" smtClean="0"/>
+              <a:rPr lang="en-US"/>
               <a:t>Fourth level</a:t>
             </a:r>
           </a:p>
           <a:p>
             <a:pPr lvl="4"/>
             <a:r>
-              <a:rPr lang="en-US" smtClean="0"/>
+              <a:rPr lang="en-US"/>
               <a:t>Fifth level</a:t>
             </a:r>
             <a:endParaRPr lang="en-US" dirty="0"/>
@@ -2426,7 +2425,7 @@
           <a:p>
             <a:pPr lvl="0"/>
             <a:r>
-              <a:rPr lang="en-US" smtClean="0"/>
+              <a:rPr lang="en-US"/>
               <a:t>Edit Master text styles</a:t>
             </a:r>
           </a:p>
@@ -2449,7 +2448,7 @@
           <a:p>
             <a:fld id="{6097C439-7116-4AF9-8B0C-274A6D902FE8}" type="datetimeFigureOut">
               <a:rPr lang="en-US" smtClean="0"/>
-              <a:t>7/20/2022</a:t>
+              <a:t>7/25/22</a:t>
             </a:fld>
             <a:endParaRPr lang="en-US"/>
           </a:p>
@@ -2552,7 +2551,7 @@
           </a:lstStyle>
           <a:p>
             <a:r>
-              <a:rPr lang="en-US" smtClean="0"/>
+              <a:rPr lang="en-US"/>
               <a:t>Click to edit Master title style</a:t>
             </a:r>
             <a:endParaRPr lang="en-US" dirty="0"/>
@@ -2617,7 +2616,7 @@
           </a:lstStyle>
           <a:p>
             <a:r>
-              <a:rPr lang="en-US" smtClean="0"/>
+              <a:rPr lang="en-US"/>
               <a:t>Click icon to add picture</a:t>
             </a:r>
             <a:endParaRPr lang="en-US" dirty="0"/>
@@ -2683,7 +2682,7 @@
           <a:p>
             <a:pPr lvl="0"/>
             <a:r>
-              <a:rPr lang="en-US" smtClean="0"/>
+              <a:rPr lang="en-US"/>
               <a:t>Edit Master text styles</a:t>
             </a:r>
           </a:p>
@@ -2706,7 +2705,7 @@
           <a:p>
             <a:fld id="{6097C439-7116-4AF9-8B0C-274A6D902FE8}" type="datetimeFigureOut">
               <a:rPr lang="en-US" smtClean="0"/>
-              <a:t>7/20/2022</a:t>
+              <a:t>7/25/22</a:t>
             </a:fld>
             <a:endParaRPr lang="en-US"/>
           </a:p>
@@ -2815,7 +2814,7 @@
           <a:lstStyle/>
           <a:p>
             <a:r>
-              <a:rPr lang="en-US" smtClean="0"/>
+              <a:rPr lang="en-US"/>
               <a:t>Click to edit Master title style</a:t>
             </a:r>
             <a:endParaRPr lang="en-US" dirty="0"/>
@@ -2849,35 +2848,35 @@
           <a:p>
             <a:pPr lvl="0"/>
             <a:r>
-              <a:rPr lang="en-US" smtClean="0"/>
+              <a:rPr lang="en-US"/>
               <a:t>Edit Master text styles</a:t>
             </a:r>
           </a:p>
           <a:p>
             <a:pPr lvl="1"/>
             <a:r>
-              <a:rPr lang="en-US" smtClean="0"/>
+              <a:rPr lang="en-US"/>
               <a:t>Second level</a:t>
             </a:r>
           </a:p>
           <a:p>
             <a:pPr lvl="2"/>
             <a:r>
-              <a:rPr lang="en-US" smtClean="0"/>
+              <a:rPr lang="en-US"/>
               <a:t>Third level</a:t>
             </a:r>
           </a:p>
           <a:p>
             <a:pPr lvl="3"/>
             <a:r>
-              <a:rPr lang="en-US" smtClean="0"/>
+              <a:rPr lang="en-US"/>
               <a:t>Fourth level</a:t>
             </a:r>
           </a:p>
           <a:p>
             <a:pPr lvl="4"/>
             <a:r>
-              <a:rPr lang="en-US" smtClean="0"/>
+              <a:rPr lang="en-US"/>
               <a:t>Fifth level</a:t>
             </a:r>
             <a:endParaRPr lang="en-US" dirty="0"/>
@@ -2919,7 +2918,7 @@
           <a:p>
             <a:fld id="{6097C439-7116-4AF9-8B0C-274A6D902FE8}" type="datetimeFigureOut">
               <a:rPr lang="en-US" smtClean="0"/>
-              <a:t>7/20/2022</a:t>
+              <a:t>7/25/22</a:t>
             </a:fld>
             <a:endParaRPr lang="en-US"/>
           </a:p>
@@ -3374,7 +3373,7 @@
         </p:nvSpPr>
         <p:spPr>
           <a:xfrm>
-            <a:off x="471488" y="714981"/>
+            <a:off x="206445" y="1694822"/>
             <a:ext cx="5915025" cy="1311128"/>
           </a:xfrm>
           <a:noFill/>
@@ -3388,22 +3387,12 @@
             <a:r>
               <a:rPr lang="en-US" sz="2800" b="1" dirty="0">
                 <a:solidFill>
-                  <a:srgbClr val="FF0000"/>
-                </a:solidFill>
-                <a:latin typeface="Arial" panose="020B0604020202020204" pitchFamily="34" charset="0"/>
-                <a:cs typeface="Arial" panose="020B0604020202020204" pitchFamily="34" charset="0"/>
-              </a:rPr>
-              <a:t>Interesting and Noteworthy Findings From MICS Analyses</a:t>
-            </a:r>
-            <a:r>
-              <a:rPr lang="en-US" sz="2800" b="1" dirty="0">
-                <a:solidFill>
                   <a:schemeClr val="bg1"/>
                 </a:solidFill>
                 <a:latin typeface="Arial" panose="020B0604020202020204" pitchFamily="34" charset="0"/>
                 <a:cs typeface="Arial" panose="020B0604020202020204" pitchFamily="34" charset="0"/>
               </a:rPr>
-              <a:t/>
+              <a:t>Interesting and Noteworthy Findings From MICS Analyses</a:t>
             </a:r>
             <a:br>
               <a:rPr lang="en-US" sz="2800" b="1" dirty="0">
@@ -3422,17 +3411,7 @@
                 <a:latin typeface="Arial" panose="020B0604020202020204" pitchFamily="34" charset="0"/>
                 <a:cs typeface="Arial" panose="020B0604020202020204" pitchFamily="34" charset="0"/>
               </a:rPr>
-              <a:t>Implications For The Cross Cultural Study Of Parenting And Child </a:t>
-            </a:r>
-            <a:r>
-              <a:rPr lang="en-US" sz="1600" b="1" dirty="0" smtClean="0">
-                <a:solidFill>
-                  <a:schemeClr val="bg1"/>
-                </a:solidFill>
-                <a:latin typeface="Arial" panose="020B0604020202020204" pitchFamily="34" charset="0"/>
-                <a:cs typeface="Arial" panose="020B0604020202020204" pitchFamily="34" charset="0"/>
-              </a:rPr>
-              <a:t>Development</a:t>
+              <a:t>Implications for the Cross-Cultural Study of Parenting and Child Development</a:t>
             </a:r>
             <a:endParaRPr lang="en-US" sz="1600" dirty="0">
               <a:solidFill>
@@ -3452,8 +3431,8 @@
         </p:nvSpPr>
         <p:spPr>
           <a:xfrm>
-            <a:off x="471487" y="3280530"/>
-            <a:ext cx="2823333" cy="5786199"/>
+            <a:off x="206445" y="3386546"/>
+            <a:ext cx="3088375" cy="5578450"/>
           </a:xfrm>
           <a:prstGeom prst="rect">
             <a:avLst/>
@@ -3482,7 +3461,7 @@
                 <a:ea typeface="Times New Roman" panose="02020603050405020304" pitchFamily="18" charset="0"/>
                 <a:cs typeface="Arial" panose="020B0604020202020204" pitchFamily="34" charset="0"/>
               </a:rPr>
-              <a:t>No Spanking</a:t>
+              <a:t>Spanking Hurts Children</a:t>
             </a:r>
           </a:p>
           <a:p>
@@ -3500,7 +3479,7 @@
                 <a:ea typeface="Cambria" panose="02040503050406030204" pitchFamily="18" charset="0"/>
                 <a:cs typeface="Arial" panose="020B0604020202020204" pitchFamily="34" charset="0"/>
               </a:rPr>
-              <a:t>Spanking is associated with decreases in child socio-emotional development &amp; with increases in child aggression.</a:t>
+              <a:t>Spanking is associated with decreased child socio-emotional development &amp; increased child aggression.</a:t>
             </a:r>
           </a:p>
           <a:p>
@@ -3521,7 +3500,7 @@
                 <a:ea typeface="Times New Roman" panose="02020603050405020304" pitchFamily="18" charset="0"/>
                 <a:cs typeface="Arial" panose="020B0604020202020204" pitchFamily="34" charset="0"/>
               </a:rPr>
-              <a:t>No Insults</a:t>
+              <a:t>Insults Contribute to Harm</a:t>
             </a:r>
           </a:p>
           <a:p>
@@ -3560,7 +3539,7 @@
                 <a:ea typeface="Times New Roman" panose="02020603050405020304" pitchFamily="18" charset="0"/>
                 <a:cs typeface="Arial" panose="020B0604020202020204" pitchFamily="34" charset="0"/>
               </a:rPr>
-              <a:t>No Physical Or Psychological Punishments</a:t>
+              <a:t>Physical and Psychological Punishment Slow Child Development</a:t>
             </a:r>
           </a:p>
           <a:p>
@@ -3578,15 +3557,7 @@
                 <a:ea typeface="Cambria" panose="02040503050406030204" pitchFamily="18" charset="0"/>
                 <a:cs typeface="Arial" panose="020B0604020202020204" pitchFamily="34" charset="0"/>
               </a:rPr>
-              <a:t>Though common, these parenting behaviors are consistently associated with decreases in child socio-emotional development &amp; with increases in child aggression</a:t>
-            </a:r>
-            <a:r>
-              <a:rPr lang="en-US" sz="1050" dirty="0" smtClean="0">
-                <a:latin typeface="Arial" panose="020B0604020202020204" pitchFamily="34" charset="0"/>
-                <a:ea typeface="Cambria" panose="02040503050406030204" pitchFamily="18" charset="0"/>
-                <a:cs typeface="Arial" panose="020B0604020202020204" pitchFamily="34" charset="0"/>
-              </a:rPr>
-              <a:t>.</a:t>
+              <a:t>Harsh punishment is consistently associated with decreased child socio-emotional development &amp; more child aggression.</a:t>
             </a:r>
           </a:p>
           <a:p>
@@ -3607,7 +3578,7 @@
                 <a:ea typeface="Times New Roman" panose="02020603050405020304" pitchFamily="18" charset="0"/>
                 <a:cs typeface="Arial" panose="020B0604020202020204" pitchFamily="34" charset="0"/>
               </a:rPr>
-              <a:t>Child Physical Abuse</a:t>
+              <a:t>Eliminating Spanking Reduces Abuse</a:t>
             </a:r>
           </a:p>
           <a:p>
@@ -3625,21 +3596,8 @@
                 <a:ea typeface="Cambria" panose="02040503050406030204" pitchFamily="18" charset="0"/>
                 <a:cs typeface="Arial" panose="020B0604020202020204" pitchFamily="34" charset="0"/>
               </a:rPr>
-              <a:t>Simulations with MICS data suggest that eliminating the use of physical punishment would be met with a large reduction in the amount of physical child abuse</a:t>
-            </a:r>
-            <a:r>
-              <a:rPr lang="en-US" sz="1050" dirty="0" smtClean="0">
-                <a:latin typeface="Arial" panose="020B0604020202020204" pitchFamily="34" charset="0"/>
-                <a:ea typeface="Cambria" panose="02040503050406030204" pitchFamily="18" charset="0"/>
-                <a:cs typeface="Arial" panose="020B0604020202020204" pitchFamily="34" charset="0"/>
-              </a:rPr>
-              <a:t>.</a:t>
-            </a:r>
-            <a:endParaRPr lang="en-US" sz="1050" dirty="0">
-              <a:latin typeface="Arial" panose="020B0604020202020204" pitchFamily="34" charset="0"/>
-              <a:ea typeface="Cambria" panose="02040503050406030204" pitchFamily="18" charset="0"/>
-              <a:cs typeface="Arial" panose="020B0604020202020204" pitchFamily="34" charset="0"/>
-            </a:endParaRPr>
+              <a:t>Simulations with MICS data suggest that eliminating spanking would result in a large reduction in global rates of physical child abuse.</a:t>
+            </a:r>
           </a:p>
           <a:p>
             <a:pPr>
@@ -3651,15 +3609,15 @@
               </a:spcAft>
             </a:pPr>
             <a:r>
-              <a:rPr lang="en-US" sz="1200" b="1" kern="0" dirty="0">
+              <a:rPr lang="en-US" b="1" kern="0" dirty="0">
                 <a:solidFill>
-                  <a:srgbClr val="0070C0"/>
+                  <a:schemeClr val="accent6"/>
                 </a:solidFill>
                 <a:latin typeface="Arial" panose="020B0604020202020204" pitchFamily="34" charset="0"/>
                 <a:ea typeface="Times New Roman" panose="02020603050405020304" pitchFamily="18" charset="0"/>
                 <a:cs typeface="Arial" panose="020B0604020202020204" pitchFamily="34" charset="0"/>
               </a:rPr>
-              <a:t>Positive Discipline</a:t>
+              <a:t>Use Positive Discipline!</a:t>
             </a:r>
           </a:p>
           <a:p>
@@ -3677,7 +3635,25 @@
                 <a:ea typeface="Cambria" panose="02040503050406030204" pitchFamily="18" charset="0"/>
                 <a:cs typeface="Arial" panose="020B0604020202020204" pitchFamily="34" charset="0"/>
               </a:rPr>
-              <a:t>Positive discipline–in the form of verbal reasoning–is generally associated with improvements in child well-being across countries, and should therefore be recommended.</a:t>
+              <a:t>Positive discipline–in the form of verbal reasoning–is associated with improved child well-being across MICS countries.</a:t>
+            </a:r>
+          </a:p>
+          <a:p>
+            <a:pPr>
+              <a:spcBef>
+                <a:spcPts val="600"/>
+              </a:spcBef>
+              <a:spcAft>
+                <a:spcPts val="600"/>
+              </a:spcAft>
+            </a:pPr>
+            <a:r>
+              <a:rPr lang="en-US" sz="1050" dirty="0">
+                <a:latin typeface="Arial" panose="020B0604020202020204" pitchFamily="34" charset="0"/>
+                <a:ea typeface="Cambria" panose="02040503050406030204" pitchFamily="18" charset="0"/>
+                <a:cs typeface="Arial" panose="020B0604020202020204" pitchFamily="34" charset="0"/>
+              </a:rPr>
+              <a:t>Positive discipline benefits children.</a:t>
             </a:r>
           </a:p>
         </p:txBody>
@@ -4092,7 +4068,7 @@
             <a:fld id="{8757FC28-EF30-4B9A-91BE-44A2E750A998}" type="datetime1">
               <a:rPr lang="en-US" smtClean="0"/>
               <a:pPr algn="ctr"/>
-              <a:t>7/20/2022</a:t>
+              <a:t>7/25/22</a:t>
             </a:fld>
             <a:endParaRPr lang="en-US" dirty="0"/>
           </a:p>
@@ -4108,13 +4084,6 @@
   <p:clrMapOvr>
     <a:masterClrMapping/>
   </p:clrMapOvr>
-  <p:timing>
-    <p:tnLst>
-      <p:par>
-        <p:cTn id="1" dur="indefinite" restart="never" nodeType="tmRoot"/>
-      </p:par>
-    </p:tnLst>
-  </p:timing>
 </p:sld>
 </file>
 

</xml_diff>